<commit_message>
Complete baseline image tests
</commit_message>
<xml_diff>
--- a/MP2/p1_alignment.pptx
+++ b/MP2/p1_alignment.pptx
@@ -7,6 +7,7 @@
   <p:sldIdLst>
     <p:sldId id="256" r:id="rId2"/>
     <p:sldId id="257" r:id="rId3"/>
+    <p:sldId id="258" r:id="rId4"/>
   </p:sldIdLst>
   <p:sldSz cx="9144000" cy="6858000" type="screen4x3"/>
   <p:notesSz cx="6858000" cy="9144000"/>
@@ -244,7 +245,7 @@
           <a:p>
             <a:fld id="{D79E64BB-AB75-461A-8D83-2089E8A97DCF}" type="datetimeFigureOut">
               <a:rPr lang="en-US" smtClean="0"/>
-              <a:t>10/11/2021</a:t>
+              <a:t>10/13/2021</a:t>
             </a:fld>
             <a:endParaRPr lang="en-US"/>
           </a:p>
@@ -414,7 +415,7 @@
           <a:p>
             <a:fld id="{D79E64BB-AB75-461A-8D83-2089E8A97DCF}" type="datetimeFigureOut">
               <a:rPr lang="en-US" smtClean="0"/>
-              <a:t>10/11/2021</a:t>
+              <a:t>10/13/2021</a:t>
             </a:fld>
             <a:endParaRPr lang="en-US"/>
           </a:p>
@@ -594,7 +595,7 @@
           <a:p>
             <a:fld id="{D79E64BB-AB75-461A-8D83-2089E8A97DCF}" type="datetimeFigureOut">
               <a:rPr lang="en-US" smtClean="0"/>
-              <a:t>10/11/2021</a:t>
+              <a:t>10/13/2021</a:t>
             </a:fld>
             <a:endParaRPr lang="en-US"/>
           </a:p>
@@ -764,7 +765,7 @@
           <a:p>
             <a:fld id="{D79E64BB-AB75-461A-8D83-2089E8A97DCF}" type="datetimeFigureOut">
               <a:rPr lang="en-US" smtClean="0"/>
-              <a:t>10/11/2021</a:t>
+              <a:t>10/13/2021</a:t>
             </a:fld>
             <a:endParaRPr lang="en-US"/>
           </a:p>
@@ -1008,7 +1009,7 @@
           <a:p>
             <a:fld id="{D79E64BB-AB75-461A-8D83-2089E8A97DCF}" type="datetimeFigureOut">
               <a:rPr lang="en-US" smtClean="0"/>
-              <a:t>10/11/2021</a:t>
+              <a:t>10/13/2021</a:t>
             </a:fld>
             <a:endParaRPr lang="en-US"/>
           </a:p>
@@ -1240,7 +1241,7 @@
           <a:p>
             <a:fld id="{D79E64BB-AB75-461A-8D83-2089E8A97DCF}" type="datetimeFigureOut">
               <a:rPr lang="en-US" smtClean="0"/>
-              <a:t>10/11/2021</a:t>
+              <a:t>10/13/2021</a:t>
             </a:fld>
             <a:endParaRPr lang="en-US"/>
           </a:p>
@@ -1607,7 +1608,7 @@
           <a:p>
             <a:fld id="{D79E64BB-AB75-461A-8D83-2089E8A97DCF}" type="datetimeFigureOut">
               <a:rPr lang="en-US" smtClean="0"/>
-              <a:t>10/11/2021</a:t>
+              <a:t>10/13/2021</a:t>
             </a:fld>
             <a:endParaRPr lang="en-US"/>
           </a:p>
@@ -1725,7 +1726,7 @@
           <a:p>
             <a:fld id="{D79E64BB-AB75-461A-8D83-2089E8A97DCF}" type="datetimeFigureOut">
               <a:rPr lang="en-US" smtClean="0"/>
-              <a:t>10/11/2021</a:t>
+              <a:t>10/13/2021</a:t>
             </a:fld>
             <a:endParaRPr lang="en-US"/>
           </a:p>
@@ -1820,7 +1821,7 @@
           <a:p>
             <a:fld id="{D79E64BB-AB75-461A-8D83-2089E8A97DCF}" type="datetimeFigureOut">
               <a:rPr lang="en-US" smtClean="0"/>
-              <a:t>10/11/2021</a:t>
+              <a:t>10/13/2021</a:t>
             </a:fld>
             <a:endParaRPr lang="en-US"/>
           </a:p>
@@ -2097,7 +2098,7 @@
           <a:p>
             <a:fld id="{D79E64BB-AB75-461A-8D83-2089E8A97DCF}" type="datetimeFigureOut">
               <a:rPr lang="en-US" smtClean="0"/>
-              <a:t>10/11/2021</a:t>
+              <a:t>10/13/2021</a:t>
             </a:fld>
             <a:endParaRPr lang="en-US"/>
           </a:p>
@@ -2354,7 +2355,7 @@
           <a:p>
             <a:fld id="{D79E64BB-AB75-461A-8D83-2089E8A97DCF}" type="datetimeFigureOut">
               <a:rPr lang="en-US" smtClean="0"/>
-              <a:t>10/11/2021</a:t>
+              <a:t>10/13/2021</a:t>
             </a:fld>
             <a:endParaRPr lang="en-US"/>
           </a:p>
@@ -2567,7 +2568,7 @@
           <a:p>
             <a:fld id="{D79E64BB-AB75-461A-8D83-2089E8A97DCF}" type="datetimeFigureOut">
               <a:rPr lang="en-US" smtClean="0"/>
-              <a:t>10/11/2021</a:t>
+              <a:t>10/13/2021</a:t>
             </a:fld>
             <a:endParaRPr lang="en-US"/>
           </a:p>
@@ -3313,6 +3314,165 @@
 </p:sld>
 </file>
 
+<file path=ppt/slides/slide3.xml><?xml version="1.0" encoding="utf-8"?>
+<p:sld xmlns:a="http://schemas.openxmlformats.org/drawingml/2006/main" xmlns:r="http://schemas.openxmlformats.org/officeDocument/2006/relationships" xmlns:p="http://schemas.openxmlformats.org/presentationml/2006/main">
+  <p:cSld>
+    <p:spTree>
+      <p:nvGrpSpPr>
+        <p:cNvPr id="1" name=""/>
+        <p:cNvGrpSpPr/>
+        <p:nvPr/>
+      </p:nvGrpSpPr>
+      <p:grpSpPr>
+        <a:xfrm>
+          <a:off x="0" y="0"/>
+          <a:ext cx="0" cy="0"/>
+          <a:chOff x="0" y="0"/>
+          <a:chExt cx="0" cy="0"/>
+        </a:xfrm>
+      </p:grpSpPr>
+      <p:pic>
+        <p:nvPicPr>
+          <p:cNvPr id="7" name="Picture 6" descr="A picture containing person, person, wall, suit&#10;&#10;Description automatically generated">
+            <a:extLst>
+              <a:ext uri="{FF2B5EF4-FFF2-40B4-BE49-F238E27FC236}">
+                <a16:creationId xmlns:a16="http://schemas.microsoft.com/office/drawing/2014/main" id="{8D58D4B4-8901-4EC8-B89D-620196484DA0}"/>
+              </a:ext>
+            </a:extLst>
+          </p:cNvPr>
+          <p:cNvPicPr>
+            <a:picLocks noChangeAspect="1"/>
+          </p:cNvPicPr>
+          <p:nvPr/>
+        </p:nvPicPr>
+        <p:blipFill rotWithShape="1">
+          <a:blip r:embed="rId2">
+            <a:extLst>
+              <a:ext uri="{28A0092B-C50C-407E-A947-70E740481C1C}">
+                <a14:useLocalDpi xmlns:a14="http://schemas.microsoft.com/office/drawing/2010/main" val="0"/>
+              </a:ext>
+            </a:extLst>
+          </a:blip>
+          <a:srcRect l="6413" t="16101" r="6821" b="18825"/>
+          <a:stretch/>
+        </p:blipFill>
+        <p:spPr>
+          <a:xfrm>
+            <a:off x="2110354" y="341442"/>
+            <a:ext cx="2572087" cy="2572087"/>
+          </a:xfrm>
+          <a:prstGeom prst="rect">
+            <a:avLst/>
+          </a:prstGeom>
+        </p:spPr>
+      </p:pic>
+      <p:pic>
+        <p:nvPicPr>
+          <p:cNvPr id="5" name="Picture 4" descr="A person in a garment&#10;&#10;Description automatically generated with medium confidence">
+            <a:extLst>
+              <a:ext uri="{FF2B5EF4-FFF2-40B4-BE49-F238E27FC236}">
+                <a16:creationId xmlns:a16="http://schemas.microsoft.com/office/drawing/2014/main" id="{CFE4C1A1-D6C8-4BCB-88F6-779BA7F84F42}"/>
+              </a:ext>
+            </a:extLst>
+          </p:cNvPr>
+          <p:cNvPicPr>
+            <a:picLocks noChangeAspect="1"/>
+          </p:cNvPicPr>
+          <p:nvPr/>
+        </p:nvPicPr>
+        <p:blipFill rotWithShape="1">
+          <a:blip r:embed="rId3">
+            <a:alphaModFix/>
+            <a:extLst>
+              <a:ext uri="{28A0092B-C50C-407E-A947-70E740481C1C}">
+                <a14:useLocalDpi xmlns:a14="http://schemas.microsoft.com/office/drawing/2010/main" val="0"/>
+              </a:ext>
+            </a:extLst>
+          </a:blip>
+          <a:srcRect l="37976" t="3773" r="34647" b="55174"/>
+          <a:stretch/>
+        </p:blipFill>
+        <p:spPr>
+          <a:xfrm flipH="1">
+            <a:off x="4871484" y="341441"/>
+            <a:ext cx="2572087" cy="2572087"/>
+          </a:xfrm>
+          <a:prstGeom prst="rect">
+            <a:avLst/>
+          </a:prstGeom>
+        </p:spPr>
+      </p:pic>
+      <p:pic>
+        <p:nvPicPr>
+          <p:cNvPr id="9" name="Picture 8">
+            <a:extLst>
+              <a:ext uri="{FF2B5EF4-FFF2-40B4-BE49-F238E27FC236}">
+                <a16:creationId xmlns:a16="http://schemas.microsoft.com/office/drawing/2014/main" id="{B66BEBD2-4D3C-4251-A51A-D593E234BC62}"/>
+              </a:ext>
+            </a:extLst>
+          </p:cNvPr>
+          <p:cNvPicPr>
+            <a:picLocks noChangeAspect="1"/>
+          </p:cNvPicPr>
+          <p:nvPr/>
+        </p:nvPicPr>
+        <p:blipFill rotWithShape="1">
+          <a:blip r:embed="rId4"/>
+          <a:srcRect l="2510" t="3349" r="51783" b="4637"/>
+          <a:stretch/>
+        </p:blipFill>
+        <p:spPr>
+          <a:xfrm>
+            <a:off x="1224944" y="3217108"/>
+            <a:ext cx="3201621" cy="3201621"/>
+          </a:xfrm>
+          <a:prstGeom prst="rect">
+            <a:avLst/>
+          </a:prstGeom>
+        </p:spPr>
+      </p:pic>
+      <p:pic>
+        <p:nvPicPr>
+          <p:cNvPr id="10" name="Picture 9">
+            <a:extLst>
+              <a:ext uri="{FF2B5EF4-FFF2-40B4-BE49-F238E27FC236}">
+                <a16:creationId xmlns:a16="http://schemas.microsoft.com/office/drawing/2014/main" id="{8F3BF81C-E866-4C07-94CF-6AE7D4B4A393}"/>
+              </a:ext>
+            </a:extLst>
+          </p:cNvPr>
+          <p:cNvPicPr>
+            <a:picLocks noChangeAspect="1"/>
+          </p:cNvPicPr>
+          <p:nvPr/>
+        </p:nvPicPr>
+        <p:blipFill rotWithShape="1">
+          <a:blip r:embed="rId4"/>
+          <a:srcRect l="52733" t="3468" r="1560" b="4518"/>
+          <a:stretch/>
+        </p:blipFill>
+        <p:spPr>
+          <a:xfrm>
+            <a:off x="5017014" y="3217107"/>
+            <a:ext cx="3201621" cy="3201621"/>
+          </a:xfrm>
+          <a:prstGeom prst="rect">
+            <a:avLst/>
+          </a:prstGeom>
+        </p:spPr>
+      </p:pic>
+    </p:spTree>
+    <p:extLst>
+      <p:ext uri="{BB962C8B-B14F-4D97-AF65-F5344CB8AC3E}">
+        <p14:creationId xmlns:p14="http://schemas.microsoft.com/office/powerpoint/2010/main" val="661411105"/>
+      </p:ext>
+    </p:extLst>
+  </p:cSld>
+  <p:clrMapOvr>
+    <a:masterClrMapping/>
+  </p:clrMapOvr>
+</p:sld>
+</file>
+
 <file path=ppt/theme/theme1.xml><?xml version="1.0" encoding="utf-8"?>
 <a:theme xmlns:a="http://schemas.openxmlformats.org/drawingml/2006/main" name="Office Theme">
   <a:themeElements>

</xml_diff>